<commit_message>
updated the powerpoint wording and structure a bit
</commit_message>
<xml_diff>
--- a/various other files/Results.pptx
+++ b/various other files/Results.pptx
@@ -6960,7 +6960,7 @@
         <p:spPr>
           <a:xfrm>
             <a:off x="720000" y="1440873"/>
-            <a:ext cx="7698022" cy="2908103"/>
+            <a:ext cx="5023715" cy="2908103"/>
           </a:xfrm>
         </p:spPr>
         <p:txBody>
@@ -6983,18 +6983,14 @@
           <a:p>
             <a:r>
               <a:rPr lang="en-US" dirty="0"/>
+              <a:t>TDA applies topological methods to analyze data.</a:t>
+            </a:r>
+          </a:p>
+          <a:p>
+            <a:r>
+              <a:rPr lang="en-US" dirty="0"/>
               <a:t>Is Topological Data Analysis (TDA) viable for flight traffic data?</a:t>
             </a:r>
-          </a:p>
-          <a:p>
-            <a:r>
-              <a:rPr lang="en-US" dirty="0"/>
-              <a:t>TDA applies topological methods to analyze data.</a:t>
-            </a:r>
-          </a:p>
-          <a:p>
-            <a:pPr lvl="1"/>
-            <a:endParaRPr lang="en-US" dirty="0"/>
           </a:p>
         </p:txBody>
       </p:sp>
@@ -7020,7 +7016,7 @@
         </p:blipFill>
         <p:spPr>
           <a:xfrm>
-            <a:off x="4569011" y="2941645"/>
+            <a:off x="5797111" y="1531024"/>
             <a:ext cx="3119862" cy="2081451"/>
           </a:xfrm>
           <a:prstGeom prst="rect">
@@ -7122,14 +7118,7 @@
             <a:pPr lvl="1"/>
             <a:r>
               <a:rPr lang="en-US" dirty="0"/>
-              <a:t>A plane aborts landing last minute.</a:t>
-            </a:r>
-          </a:p>
-          <a:p>
-            <a:pPr lvl="1"/>
-            <a:r>
-              <a:rPr lang="en-US" dirty="0"/>
-              <a:t>Happens due to runway issues, weather, or unstable approach.</a:t>
+              <a:t>Last minute aborted landing due to runway issues, weather, or unstable approach.</a:t>
             </a:r>
           </a:p>
           <a:p>
@@ -7336,7 +7325,7 @@
             <a:pPr lvl="1"/>
             <a:r>
               <a:rPr lang="en-US" dirty="0"/>
-              <a:t>Naïve detection using basic flight parameters (e.g., altitude, speed).</a:t>
+              <a:t>Naïve features such as pitch, rotation and speed</a:t>
             </a:r>
           </a:p>
           <a:p>
@@ -7349,7 +7338,7 @@
             <a:pPr lvl="1"/>
             <a:r>
               <a:rPr lang="en-US" dirty="0"/>
-              <a:t>Captures 2D features</a:t>
+              <a:t>Captures 2D features like Cycles and turns</a:t>
             </a:r>
           </a:p>
           <a:p>
@@ -7362,7 +7351,7 @@
             <a:pPr lvl="1"/>
             <a:r>
               <a:rPr lang="en-US" dirty="0"/>
-              <a:t>Detects topological signatures of climbs/descents </a:t>
+              <a:t>Detects topological data of climbs/descents </a:t>
             </a:r>
           </a:p>
           <a:p>

</xml_diff>